<commit_message>
Update presentations with new color standards.
</commit_message>
<xml_diff>
--- a/presentations/03.3_functions.pptx
+++ b/presentations/03.3_functions.pptx
@@ -226,7 +226,7 @@
           <a:p>
             <a:fld id="{FD93C9B2-20F6-4DB1-B471-224337D0AC79}" type="datetimeFigureOut">
               <a:rPr lang="en-US" smtClean="0"/>
-              <a:t>11/18/2022</a:t>
+              <a:t>1/11/2023</a:t>
             </a:fld>
             <a:endParaRPr lang="en-US"/>
           </a:p>
@@ -3490,7 +3490,7 @@
           <a:p>
             <a:fld id="{C3F78080-8D0A-4BE8-A5B4-CB115102D524}" type="datetimeFigureOut">
               <a:rPr lang="en-US" smtClean="0"/>
-              <a:t>11/18/2022</a:t>
+              <a:t>1/11/2023</a:t>
             </a:fld>
             <a:endParaRPr lang="en-US"/>
           </a:p>
@@ -3688,7 +3688,7 @@
           <a:p>
             <a:fld id="{C3F78080-8D0A-4BE8-A5B4-CB115102D524}" type="datetimeFigureOut">
               <a:rPr lang="en-US" smtClean="0"/>
-              <a:t>11/18/2022</a:t>
+              <a:t>1/11/2023</a:t>
             </a:fld>
             <a:endParaRPr lang="en-US"/>
           </a:p>
@@ -3896,7 +3896,7 @@
           <a:p>
             <a:fld id="{C3F78080-8D0A-4BE8-A5B4-CB115102D524}" type="datetimeFigureOut">
               <a:rPr lang="en-US" smtClean="0"/>
-              <a:t>11/18/2022</a:t>
+              <a:t>1/11/2023</a:t>
             </a:fld>
             <a:endParaRPr lang="en-US"/>
           </a:p>
@@ -4094,7 +4094,7 @@
           <a:p>
             <a:fld id="{C3F78080-8D0A-4BE8-A5B4-CB115102D524}" type="datetimeFigureOut">
               <a:rPr lang="en-US" smtClean="0"/>
-              <a:t>11/18/2022</a:t>
+              <a:t>1/11/2023</a:t>
             </a:fld>
             <a:endParaRPr lang="en-US"/>
           </a:p>
@@ -4369,7 +4369,7 @@
           <a:p>
             <a:fld id="{C3F78080-8D0A-4BE8-A5B4-CB115102D524}" type="datetimeFigureOut">
               <a:rPr lang="en-US" smtClean="0"/>
-              <a:t>11/18/2022</a:t>
+              <a:t>1/11/2023</a:t>
             </a:fld>
             <a:endParaRPr lang="en-US"/>
           </a:p>
@@ -4634,7 +4634,7 @@
           <a:p>
             <a:fld id="{C3F78080-8D0A-4BE8-A5B4-CB115102D524}" type="datetimeFigureOut">
               <a:rPr lang="en-US" smtClean="0"/>
-              <a:t>11/18/2022</a:t>
+              <a:t>1/11/2023</a:t>
             </a:fld>
             <a:endParaRPr lang="en-US"/>
           </a:p>
@@ -5046,7 +5046,7 @@
           <a:p>
             <a:fld id="{C3F78080-8D0A-4BE8-A5B4-CB115102D524}" type="datetimeFigureOut">
               <a:rPr lang="en-US" smtClean="0"/>
-              <a:t>11/18/2022</a:t>
+              <a:t>1/11/2023</a:t>
             </a:fld>
             <a:endParaRPr lang="en-US"/>
           </a:p>
@@ -5187,7 +5187,7 @@
           <a:p>
             <a:fld id="{C3F78080-8D0A-4BE8-A5B4-CB115102D524}" type="datetimeFigureOut">
               <a:rPr lang="en-US" smtClean="0"/>
-              <a:t>11/18/2022</a:t>
+              <a:t>1/11/2023</a:t>
             </a:fld>
             <a:endParaRPr lang="en-US"/>
           </a:p>
@@ -5300,7 +5300,7 @@
           <a:p>
             <a:fld id="{C3F78080-8D0A-4BE8-A5B4-CB115102D524}" type="datetimeFigureOut">
               <a:rPr lang="en-US" smtClean="0"/>
-              <a:t>11/18/2022</a:t>
+              <a:t>1/11/2023</a:t>
             </a:fld>
             <a:endParaRPr lang="en-US"/>
           </a:p>
@@ -5611,7 +5611,7 @@
           <a:p>
             <a:fld id="{C3F78080-8D0A-4BE8-A5B4-CB115102D524}" type="datetimeFigureOut">
               <a:rPr lang="en-US" smtClean="0"/>
-              <a:t>11/18/2022</a:t>
+              <a:t>1/11/2023</a:t>
             </a:fld>
             <a:endParaRPr lang="en-US"/>
           </a:p>
@@ -5899,7 +5899,7 @@
           <a:p>
             <a:fld id="{C3F78080-8D0A-4BE8-A5B4-CB115102D524}" type="datetimeFigureOut">
               <a:rPr lang="en-US" smtClean="0"/>
-              <a:t>11/18/2022</a:t>
+              <a:t>1/11/2023</a:t>
             </a:fld>
             <a:endParaRPr lang="en-US"/>
           </a:p>
@@ -6140,7 +6140,7 @@
           <a:p>
             <a:fld id="{C3F78080-8D0A-4BE8-A5B4-CB115102D524}" type="datetimeFigureOut">
               <a:rPr lang="en-US" smtClean="0"/>
-              <a:t>11/18/2022</a:t>
+              <a:t>1/11/2023</a:t>
             </a:fld>
             <a:endParaRPr lang="en-US"/>
           </a:p>
@@ -7057,16 +7057,10 @@
             <a:avLst/>
           </a:prstGeom>
           <a:solidFill>
-            <a:schemeClr val="bg1">
-              <a:lumMod val="95000"/>
-            </a:schemeClr>
+            <a:schemeClr val="bg1"/>
           </a:solidFill>
           <a:ln>
-            <a:solidFill>
-              <a:schemeClr val="bg1">
-                <a:lumMod val="85000"/>
-              </a:schemeClr>
-            </a:solidFill>
+            <a:noFill/>
           </a:ln>
         </p:spPr>
         <p:txBody>
@@ -7974,35 +7968,35 @@
             <a:r>
               <a:rPr lang="en-US" sz="2400" dirty="0">
                 <a:solidFill>
-                  <a:srgbClr val="482DFF"/>
+                  <a:srgbClr val="5A5AA8"/>
                 </a:solidFill>
                 <a:effectLst/>
                 <a:latin typeface="Consolas" panose="020B0609020204030204" pitchFamily="49" charset="0"/>
                 <a:cs typeface="Consolas" panose="020B0609020204030204" pitchFamily="49" charset="0"/>
               </a:rPr>
-              <a:t>multiply</a:t>
+              <a:t>multiply()</a:t>
             </a:r>
             <a:r>
               <a:rPr lang="en-US" sz="2400" dirty="0">
                 <a:solidFill>
-                  <a:srgbClr val="000000"/>
-                </a:solidFill>
-                <a:effectLst/>
-                <a:latin typeface="Consolas" panose="020B0609020204030204" pitchFamily="49" charset="0"/>
-                <a:cs typeface="Consolas" panose="020B0609020204030204" pitchFamily="49" charset="0"/>
-              </a:rPr>
-              <a:t>()</a:t>
-            </a:r>
-            <a:r>
-              <a:rPr lang="en-US" sz="2400" dirty="0">
-                <a:solidFill>
-                  <a:srgbClr val="000000"/>
+                  <a:srgbClr val="5A5AA8"/>
                 </a:solidFill>
                 <a:effectLst/>
                 <a:latin typeface="Avenir" panose="02000503020000020003" pitchFamily="2" charset="0"/>
                 <a:cs typeface="Courier New" panose="02070309020205020404" pitchFamily="49" charset="0"/>
               </a:rPr>
-              <a:t> function takes two arguments </a:t>
+              <a:t> </a:t>
+            </a:r>
+            <a:r>
+              <a:rPr lang="en-US" sz="2400" dirty="0">
+                <a:solidFill>
+                  <a:srgbClr val="000000"/>
+                </a:solidFill>
+                <a:effectLst/>
+                <a:latin typeface="Avenir" panose="02000503020000020003" pitchFamily="2" charset="0"/>
+                <a:cs typeface="Courier New" panose="02070309020205020404" pitchFamily="49" charset="0"/>
+              </a:rPr>
+              <a:t>function takes two arguments </a:t>
             </a:r>
           </a:p>
           <a:p>
@@ -8538,7 +8532,7 @@
         </p:nvSpPr>
         <p:spPr>
           <a:xfrm>
-            <a:off x="0" y="365127"/>
+            <a:off x="0" y="36949"/>
             <a:ext cx="12192000" cy="1325563"/>
           </a:xfrm>
         </p:spPr>
@@ -8550,7 +8544,13 @@
           <a:p>
             <a:pPr algn="ctr"/>
             <a:r>
-              <a:rPr lang="en-US" dirty="0">
+              <a:rPr lang="en-US" sz="4000" dirty="0">
+                <a:solidFill>
+                  <a:schemeClr val="tx1">
+                    <a:lumMod val="75000"/>
+                    <a:lumOff val="25000"/>
+                  </a:schemeClr>
+                </a:solidFill>
                 <a:latin typeface="Avenir Heavy"/>
               </a:rPr>
               <a:t>Flowcharts and Pseudocode</a:t>
@@ -8558,37 +8558,1525 @@
           </a:p>
         </p:txBody>
       </p:sp>
-      <p:pic>
-        <p:nvPicPr>
-          <p:cNvPr id="4" name="Picture 3">
+      <p:grpSp>
+        <p:nvGrpSpPr>
+          <p:cNvPr id="58" name="Group 57">
             <a:extLst>
               <a:ext uri="{FF2B5EF4-FFF2-40B4-BE49-F238E27FC236}">
-                <a16:creationId xmlns:a16="http://schemas.microsoft.com/office/drawing/2014/main" id="{D44341CC-A466-4BEB-BA31-36548FF91DB8}"/>
+                <a16:creationId xmlns:a16="http://schemas.microsoft.com/office/drawing/2014/main" id="{628B0EC7-8708-11D0-F586-64B8BC792616}"/>
               </a:ext>
             </a:extLst>
           </p:cNvPr>
-          <p:cNvPicPr>
-            <a:picLocks noChangeAspect="1"/>
-          </p:cNvPicPr>
+          <p:cNvGrpSpPr/>
           <p:nvPr/>
-        </p:nvPicPr>
-        <p:blipFill>
-          <a:blip r:embed="rId3"/>
-          <a:stretch>
-            <a:fillRect/>
-          </a:stretch>
-        </p:blipFill>
-        <p:spPr>
+        </p:nvGrpSpPr>
+        <p:grpSpPr>
           <a:xfrm>
-            <a:off x="4317391" y="1690690"/>
-            <a:ext cx="3557218" cy="4351338"/>
+            <a:off x="3966057" y="1133333"/>
+            <a:ext cx="4797043" cy="5391952"/>
+            <a:chOff x="4222089" y="1169909"/>
+            <a:chExt cx="4797043" cy="5391952"/>
           </a:xfrm>
-          <a:prstGeom prst="rect">
-            <a:avLst/>
-          </a:prstGeom>
-          <a:noFill/>
-        </p:spPr>
-      </p:pic>
+        </p:grpSpPr>
+        <p:cxnSp>
+          <p:nvCxnSpPr>
+            <p:cNvPr id="49" name="Straight Connector 48">
+              <a:extLst>
+                <a:ext uri="{FF2B5EF4-FFF2-40B4-BE49-F238E27FC236}">
+                  <a16:creationId xmlns:a16="http://schemas.microsoft.com/office/drawing/2014/main" id="{7D5A9692-74A7-0EC0-385A-F48B2C27D4C5}"/>
+                </a:ext>
+              </a:extLst>
+            </p:cNvPr>
+            <p:cNvCxnSpPr>
+              <a:cxnSpLocks/>
+            </p:cNvCxnSpPr>
+            <p:nvPr/>
+          </p:nvCxnSpPr>
+          <p:spPr>
+            <a:xfrm>
+              <a:off x="8128734" y="1668578"/>
+              <a:ext cx="0" cy="1712319"/>
+            </a:xfrm>
+            <a:prstGeom prst="line">
+              <a:avLst/>
+            </a:prstGeom>
+            <a:ln w="28575">
+              <a:solidFill>
+                <a:srgbClr val="30335D"/>
+              </a:solidFill>
+            </a:ln>
+          </p:spPr>
+          <p:style>
+            <a:lnRef idx="1">
+              <a:schemeClr val="accent1"/>
+            </a:lnRef>
+            <a:fillRef idx="0">
+              <a:schemeClr val="accent1"/>
+            </a:fillRef>
+            <a:effectRef idx="0">
+              <a:schemeClr val="accent1"/>
+            </a:effectRef>
+            <a:fontRef idx="minor">
+              <a:schemeClr val="tx1"/>
+            </a:fontRef>
+          </p:style>
+        </p:cxnSp>
+        <p:cxnSp>
+          <p:nvCxnSpPr>
+            <p:cNvPr id="45" name="Straight Connector 44">
+              <a:extLst>
+                <a:ext uri="{FF2B5EF4-FFF2-40B4-BE49-F238E27FC236}">
+                  <a16:creationId xmlns:a16="http://schemas.microsoft.com/office/drawing/2014/main" id="{81EC34E9-B547-D51A-7BC9-4F3A00D9BF5F}"/>
+                </a:ext>
+              </a:extLst>
+            </p:cNvPr>
+            <p:cNvCxnSpPr>
+              <a:cxnSpLocks/>
+            </p:cNvCxnSpPr>
+            <p:nvPr/>
+          </p:nvCxnSpPr>
+          <p:spPr>
+            <a:xfrm>
+              <a:off x="5998464" y="4860152"/>
+              <a:ext cx="2122337" cy="0"/>
+            </a:xfrm>
+            <a:prstGeom prst="line">
+              <a:avLst/>
+            </a:prstGeom>
+            <a:ln w="25400">
+              <a:solidFill>
+                <a:srgbClr val="30335D"/>
+              </a:solidFill>
+            </a:ln>
+          </p:spPr>
+          <p:style>
+            <a:lnRef idx="1">
+              <a:schemeClr val="accent1"/>
+            </a:lnRef>
+            <a:fillRef idx="0">
+              <a:schemeClr val="accent1"/>
+            </a:fillRef>
+            <a:effectRef idx="0">
+              <a:schemeClr val="accent1"/>
+            </a:effectRef>
+            <a:fontRef idx="minor">
+              <a:schemeClr val="tx1"/>
+            </a:fontRef>
+          </p:style>
+        </p:cxnSp>
+        <p:sp>
+          <p:nvSpPr>
+            <p:cNvPr id="3" name="Rounded Rectangle 2">
+              <a:extLst>
+                <a:ext uri="{FF2B5EF4-FFF2-40B4-BE49-F238E27FC236}">
+                  <a16:creationId xmlns:a16="http://schemas.microsoft.com/office/drawing/2014/main" id="{88AE685E-E8E2-DE99-9C69-E977376F985B}"/>
+                </a:ext>
+              </a:extLst>
+            </p:cNvPr>
+            <p:cNvSpPr/>
+            <p:nvPr/>
+          </p:nvSpPr>
+          <p:spPr>
+            <a:xfrm>
+              <a:off x="4499602" y="1823017"/>
+              <a:ext cx="1937774" cy="630716"/>
+            </a:xfrm>
+            <a:prstGeom prst="roundRect">
+              <a:avLst/>
+            </a:prstGeom>
+            <a:solidFill>
+              <a:srgbClr val="DCEBF5"/>
+            </a:solidFill>
+            <a:ln w="19050">
+              <a:solidFill>
+                <a:srgbClr val="30335D"/>
+              </a:solidFill>
+            </a:ln>
+          </p:spPr>
+          <p:style>
+            <a:lnRef idx="2">
+              <a:schemeClr val="accent1">
+                <a:shade val="50000"/>
+              </a:schemeClr>
+            </a:lnRef>
+            <a:fillRef idx="1">
+              <a:schemeClr val="accent1"/>
+            </a:fillRef>
+            <a:effectRef idx="0">
+              <a:schemeClr val="accent1"/>
+            </a:effectRef>
+            <a:fontRef idx="minor">
+              <a:schemeClr val="lt1"/>
+            </a:fontRef>
+          </p:style>
+          <p:txBody>
+            <a:bodyPr rtlCol="0" anchor="ctr"/>
+            <a:lstStyle/>
+            <a:p>
+              <a:pPr algn="ctr"/>
+              <a:endParaRPr lang="en-US"/>
+            </a:p>
+          </p:txBody>
+        </p:sp>
+        <p:sp>
+          <p:nvSpPr>
+            <p:cNvPr id="5" name="TextBox 4">
+              <a:extLst>
+                <a:ext uri="{FF2B5EF4-FFF2-40B4-BE49-F238E27FC236}">
+                  <a16:creationId xmlns:a16="http://schemas.microsoft.com/office/drawing/2014/main" id="{F970AA77-0A5F-4A6B-FBDB-E379F5355FE4}"/>
+                </a:ext>
+              </a:extLst>
+            </p:cNvPr>
+            <p:cNvSpPr txBox="1"/>
+            <p:nvPr/>
+          </p:nvSpPr>
+          <p:spPr>
+            <a:xfrm>
+              <a:off x="4499601" y="1887025"/>
+              <a:ext cx="1937774" cy="523220"/>
+            </a:xfrm>
+            <a:prstGeom prst="rect">
+              <a:avLst/>
+            </a:prstGeom>
+            <a:noFill/>
+            <a:ln>
+              <a:noFill/>
+            </a:ln>
+          </p:spPr>
+          <p:txBody>
+            <a:bodyPr wrap="square" rtlCol="0">
+              <a:spAutoFit/>
+            </a:bodyPr>
+            <a:lstStyle/>
+            <a:p>
+              <a:pPr algn="ctr"/>
+              <a:r>
+                <a:rPr lang="en-US" sz="1400" dirty="0">
+                  <a:latin typeface="Avenir" panose="02000503020000020003" pitchFamily="2" charset="0"/>
+                </a:rPr>
+                <a:t>Read input from </a:t>
+              </a:r>
+            </a:p>
+            <a:p>
+              <a:pPr algn="ctr"/>
+              <a:r>
+                <a:rPr lang="en-US" sz="1400" dirty="0">
+                  <a:latin typeface="Avenir" panose="02000503020000020003" pitchFamily="2" charset="0"/>
+                </a:rPr>
+                <a:t>pin 13 Arduino</a:t>
+              </a:r>
+            </a:p>
+          </p:txBody>
+        </p:sp>
+        <p:sp>
+          <p:nvSpPr>
+            <p:cNvPr id="6" name="Rounded Rectangle 5">
+              <a:extLst>
+                <a:ext uri="{FF2B5EF4-FFF2-40B4-BE49-F238E27FC236}">
+                  <a16:creationId xmlns:a16="http://schemas.microsoft.com/office/drawing/2014/main" id="{E78920A2-3C52-A093-8F9A-7C36926E9C7D}"/>
+                </a:ext>
+              </a:extLst>
+            </p:cNvPr>
+            <p:cNvSpPr/>
+            <p:nvPr/>
+          </p:nvSpPr>
+          <p:spPr>
+            <a:xfrm>
+              <a:off x="4500271" y="3543131"/>
+              <a:ext cx="1937775" cy="830997"/>
+            </a:xfrm>
+            <a:prstGeom prst="roundRect">
+              <a:avLst/>
+            </a:prstGeom>
+            <a:solidFill>
+              <a:srgbClr val="DCEBF5"/>
+            </a:solidFill>
+            <a:ln w="19050">
+              <a:solidFill>
+                <a:srgbClr val="30335D"/>
+              </a:solidFill>
+            </a:ln>
+          </p:spPr>
+          <p:style>
+            <a:lnRef idx="2">
+              <a:schemeClr val="accent1">
+                <a:shade val="50000"/>
+              </a:schemeClr>
+            </a:lnRef>
+            <a:fillRef idx="1">
+              <a:schemeClr val="accent1"/>
+            </a:fillRef>
+            <a:effectRef idx="0">
+              <a:schemeClr val="accent1"/>
+            </a:effectRef>
+            <a:fontRef idx="minor">
+              <a:schemeClr val="lt1"/>
+            </a:fontRef>
+          </p:style>
+          <p:txBody>
+            <a:bodyPr rtlCol="0" anchor="ctr"/>
+            <a:lstStyle/>
+            <a:p>
+              <a:pPr algn="ctr"/>
+              <a:endParaRPr lang="en-US"/>
+            </a:p>
+          </p:txBody>
+        </p:sp>
+        <p:sp>
+          <p:nvSpPr>
+            <p:cNvPr id="7" name="TextBox 6">
+              <a:extLst>
+                <a:ext uri="{FF2B5EF4-FFF2-40B4-BE49-F238E27FC236}">
+                  <a16:creationId xmlns:a16="http://schemas.microsoft.com/office/drawing/2014/main" id="{60704B6F-4E5D-0B19-AB99-2014B7889D8D}"/>
+                </a:ext>
+              </a:extLst>
+            </p:cNvPr>
+            <p:cNvSpPr txBox="1"/>
+            <p:nvPr/>
+          </p:nvSpPr>
+          <p:spPr>
+            <a:xfrm>
+              <a:off x="4222089" y="3591936"/>
+              <a:ext cx="2486416" cy="738664"/>
+            </a:xfrm>
+            <a:prstGeom prst="rect">
+              <a:avLst/>
+            </a:prstGeom>
+            <a:noFill/>
+            <a:ln>
+              <a:noFill/>
+            </a:ln>
+          </p:spPr>
+          <p:txBody>
+            <a:bodyPr wrap="square" rtlCol="0">
+              <a:spAutoFit/>
+            </a:bodyPr>
+            <a:lstStyle/>
+            <a:p>
+              <a:pPr algn="ctr"/>
+              <a:r>
+                <a:rPr lang="en-US" sz="1400" dirty="0">
+                  <a:latin typeface="Avenir" panose="02000503020000020003" pitchFamily="2" charset="0"/>
+                </a:rPr>
+                <a:t>Capture the image</a:t>
+              </a:r>
+            </a:p>
+            <a:p>
+              <a:pPr algn="ctr"/>
+              <a:r>
+                <a:rPr lang="en-US" sz="1400" dirty="0">
+                  <a:latin typeface="Avenir" panose="02000503020000020003" pitchFamily="2" charset="0"/>
+                </a:rPr>
+                <a:t>Get a confirmation </a:t>
+              </a:r>
+            </a:p>
+            <a:p>
+              <a:pPr algn="ctr"/>
+              <a:r>
+                <a:rPr lang="en-US" sz="1400" dirty="0">
+                  <a:latin typeface="Avenir" panose="02000503020000020003" pitchFamily="2" charset="0"/>
+                </a:rPr>
+                <a:t>from user</a:t>
+              </a:r>
+            </a:p>
+          </p:txBody>
+        </p:sp>
+        <p:sp>
+          <p:nvSpPr>
+            <p:cNvPr id="8" name="Rounded Rectangle 7">
+              <a:extLst>
+                <a:ext uri="{FF2B5EF4-FFF2-40B4-BE49-F238E27FC236}">
+                  <a16:creationId xmlns:a16="http://schemas.microsoft.com/office/drawing/2014/main" id="{D1FCDD96-A6E9-BAFF-479E-B2AEF81E9074}"/>
+                </a:ext>
+              </a:extLst>
+            </p:cNvPr>
+            <p:cNvSpPr/>
+            <p:nvPr/>
+          </p:nvSpPr>
+          <p:spPr>
+            <a:xfrm>
+              <a:off x="7193380" y="3317480"/>
+              <a:ext cx="1728217" cy="841028"/>
+            </a:xfrm>
+            <a:prstGeom prst="roundRect">
+              <a:avLst/>
+            </a:prstGeom>
+            <a:solidFill>
+              <a:srgbClr val="DCEBF5"/>
+            </a:solidFill>
+            <a:ln w="19050">
+              <a:solidFill>
+                <a:srgbClr val="30335D"/>
+              </a:solidFill>
+            </a:ln>
+          </p:spPr>
+          <p:style>
+            <a:lnRef idx="2">
+              <a:schemeClr val="accent1">
+                <a:shade val="50000"/>
+              </a:schemeClr>
+            </a:lnRef>
+            <a:fillRef idx="1">
+              <a:schemeClr val="accent1"/>
+            </a:fillRef>
+            <a:effectRef idx="0">
+              <a:schemeClr val="accent1"/>
+            </a:effectRef>
+            <a:fontRef idx="minor">
+              <a:schemeClr val="lt1"/>
+            </a:fontRef>
+          </p:style>
+          <p:txBody>
+            <a:bodyPr rtlCol="0" anchor="ctr"/>
+            <a:lstStyle/>
+            <a:p>
+              <a:pPr algn="ctr"/>
+              <a:endParaRPr lang="en-US"/>
+            </a:p>
+          </p:txBody>
+        </p:sp>
+        <p:sp>
+          <p:nvSpPr>
+            <p:cNvPr id="9" name="TextBox 8">
+              <a:extLst>
+                <a:ext uri="{FF2B5EF4-FFF2-40B4-BE49-F238E27FC236}">
+                  <a16:creationId xmlns:a16="http://schemas.microsoft.com/office/drawing/2014/main" id="{218D8449-316C-D0DD-39A9-8168907A7AF1}"/>
+                </a:ext>
+              </a:extLst>
+            </p:cNvPr>
+            <p:cNvSpPr txBox="1"/>
+            <p:nvPr/>
+          </p:nvSpPr>
+          <p:spPr>
+            <a:xfrm>
+              <a:off x="7081358" y="3378440"/>
+              <a:ext cx="1937774" cy="954107"/>
+            </a:xfrm>
+            <a:prstGeom prst="rect">
+              <a:avLst/>
+            </a:prstGeom>
+            <a:noFill/>
+            <a:ln>
+              <a:noFill/>
+            </a:ln>
+          </p:spPr>
+          <p:txBody>
+            <a:bodyPr wrap="square" rtlCol="0">
+              <a:spAutoFit/>
+            </a:bodyPr>
+            <a:lstStyle/>
+            <a:p>
+              <a:pPr algn="ctr"/>
+              <a:r>
+                <a:rPr lang="en-US" sz="1400" dirty="0">
+                  <a:latin typeface="Avenir" panose="02000503020000020003" pitchFamily="2" charset="0"/>
+                </a:rPr>
+                <a:t>Send HIGH output </a:t>
+              </a:r>
+            </a:p>
+            <a:p>
+              <a:pPr algn="ctr"/>
+              <a:r>
+                <a:rPr lang="en-US" sz="1400" dirty="0">
+                  <a:latin typeface="Avenir" panose="02000503020000020003" pitchFamily="2" charset="0"/>
+                </a:rPr>
+                <a:t>to pin 11 Arduino</a:t>
+              </a:r>
+            </a:p>
+            <a:p>
+              <a:pPr algn="ctr"/>
+              <a:r>
+                <a:rPr lang="en-US" sz="1400" dirty="0">
+                  <a:latin typeface="Avenir" panose="02000503020000020003" pitchFamily="2" charset="0"/>
+                </a:rPr>
+                <a:t>Delete the image</a:t>
+              </a:r>
+            </a:p>
+            <a:p>
+              <a:pPr algn="ctr"/>
+              <a:endParaRPr lang="en-US" sz="1400" dirty="0">
+                <a:latin typeface="Avenir" panose="02000503020000020003" pitchFamily="2" charset="0"/>
+              </a:endParaRPr>
+            </a:p>
+          </p:txBody>
+        </p:sp>
+        <p:sp>
+          <p:nvSpPr>
+            <p:cNvPr id="10" name="Rounded Rectangle 9">
+              <a:extLst>
+                <a:ext uri="{FF2B5EF4-FFF2-40B4-BE49-F238E27FC236}">
+                  <a16:creationId xmlns:a16="http://schemas.microsoft.com/office/drawing/2014/main" id="{E8A3320B-9EAB-36DA-C0CE-74113D1CD958}"/>
+                </a:ext>
+              </a:extLst>
+            </p:cNvPr>
+            <p:cNvSpPr/>
+            <p:nvPr/>
+          </p:nvSpPr>
+          <p:spPr>
+            <a:xfrm>
+              <a:off x="5047488" y="1169909"/>
+              <a:ext cx="795528" cy="450751"/>
+            </a:xfrm>
+            <a:prstGeom prst="roundRect">
+              <a:avLst>
+                <a:gd name="adj" fmla="val 50000"/>
+              </a:avLst>
+            </a:prstGeom>
+            <a:solidFill>
+              <a:srgbClr val="DCEBF5"/>
+            </a:solidFill>
+            <a:ln w="19050">
+              <a:solidFill>
+                <a:srgbClr val="30335D"/>
+              </a:solidFill>
+            </a:ln>
+          </p:spPr>
+          <p:style>
+            <a:lnRef idx="2">
+              <a:schemeClr val="accent1">
+                <a:shade val="50000"/>
+              </a:schemeClr>
+            </a:lnRef>
+            <a:fillRef idx="1">
+              <a:schemeClr val="accent1"/>
+            </a:fillRef>
+            <a:effectRef idx="0">
+              <a:schemeClr val="accent1"/>
+            </a:effectRef>
+            <a:fontRef idx="minor">
+              <a:schemeClr val="lt1"/>
+            </a:fontRef>
+          </p:style>
+          <p:txBody>
+            <a:bodyPr rtlCol="0" anchor="ctr"/>
+            <a:lstStyle/>
+            <a:p>
+              <a:pPr algn="ctr"/>
+              <a:endParaRPr lang="en-US"/>
+            </a:p>
+          </p:txBody>
+        </p:sp>
+        <p:sp>
+          <p:nvSpPr>
+            <p:cNvPr id="11" name="TextBox 10">
+              <a:extLst>
+                <a:ext uri="{FF2B5EF4-FFF2-40B4-BE49-F238E27FC236}">
+                  <a16:creationId xmlns:a16="http://schemas.microsoft.com/office/drawing/2014/main" id="{50094E26-933B-7A97-1D85-0ABC52548F93}"/>
+                </a:ext>
+              </a:extLst>
+            </p:cNvPr>
+            <p:cNvSpPr txBox="1"/>
+            <p:nvPr/>
+          </p:nvSpPr>
+          <p:spPr>
+            <a:xfrm>
+              <a:off x="4892039" y="1222778"/>
+              <a:ext cx="1106425" cy="307777"/>
+            </a:xfrm>
+            <a:prstGeom prst="rect">
+              <a:avLst/>
+            </a:prstGeom>
+            <a:noFill/>
+            <a:ln>
+              <a:noFill/>
+            </a:ln>
+          </p:spPr>
+          <p:txBody>
+            <a:bodyPr wrap="square" rtlCol="0">
+              <a:spAutoFit/>
+            </a:bodyPr>
+            <a:lstStyle/>
+            <a:p>
+              <a:pPr algn="ctr"/>
+              <a:r>
+                <a:rPr lang="en-US" sz="1400" dirty="0">
+                  <a:latin typeface="Avenir" panose="02000503020000020003" pitchFamily="2" charset="0"/>
+                </a:rPr>
+                <a:t>Start</a:t>
+              </a:r>
+            </a:p>
+          </p:txBody>
+        </p:sp>
+        <p:sp>
+          <p:nvSpPr>
+            <p:cNvPr id="12" name="Rounded Rectangle 11">
+              <a:extLst>
+                <a:ext uri="{FF2B5EF4-FFF2-40B4-BE49-F238E27FC236}">
+                  <a16:creationId xmlns:a16="http://schemas.microsoft.com/office/drawing/2014/main" id="{838703AF-ACE8-5736-E74C-80B81531EE4A}"/>
+                </a:ext>
+              </a:extLst>
+            </p:cNvPr>
+            <p:cNvSpPr/>
+            <p:nvPr/>
+          </p:nvSpPr>
+          <p:spPr>
+            <a:xfrm>
+              <a:off x="5060492" y="6111110"/>
+              <a:ext cx="749809" cy="450751"/>
+            </a:xfrm>
+            <a:prstGeom prst="roundRect">
+              <a:avLst>
+                <a:gd name="adj" fmla="val 50000"/>
+              </a:avLst>
+            </a:prstGeom>
+            <a:solidFill>
+              <a:srgbClr val="DCEBF5"/>
+            </a:solidFill>
+            <a:ln w="19050">
+              <a:solidFill>
+                <a:srgbClr val="30335D"/>
+              </a:solidFill>
+            </a:ln>
+          </p:spPr>
+          <p:style>
+            <a:lnRef idx="2">
+              <a:schemeClr val="accent1">
+                <a:shade val="50000"/>
+              </a:schemeClr>
+            </a:lnRef>
+            <a:fillRef idx="1">
+              <a:schemeClr val="accent1"/>
+            </a:fillRef>
+            <a:effectRef idx="0">
+              <a:schemeClr val="accent1"/>
+            </a:effectRef>
+            <a:fontRef idx="minor">
+              <a:schemeClr val="lt1"/>
+            </a:fontRef>
+          </p:style>
+          <p:txBody>
+            <a:bodyPr rtlCol="0" anchor="ctr"/>
+            <a:lstStyle/>
+            <a:p>
+              <a:pPr algn="ctr"/>
+              <a:endParaRPr lang="en-US"/>
+            </a:p>
+          </p:txBody>
+        </p:sp>
+        <p:sp>
+          <p:nvSpPr>
+            <p:cNvPr id="13" name="TextBox 12">
+              <a:extLst>
+                <a:ext uri="{FF2B5EF4-FFF2-40B4-BE49-F238E27FC236}">
+                  <a16:creationId xmlns:a16="http://schemas.microsoft.com/office/drawing/2014/main" id="{FF688490-3A32-15E7-4742-3973A0007F1F}"/>
+                </a:ext>
+              </a:extLst>
+            </p:cNvPr>
+            <p:cNvSpPr txBox="1"/>
+            <p:nvPr/>
+          </p:nvSpPr>
+          <p:spPr>
+            <a:xfrm>
+              <a:off x="4892039" y="6163979"/>
+              <a:ext cx="1106425" cy="307777"/>
+            </a:xfrm>
+            <a:prstGeom prst="rect">
+              <a:avLst/>
+            </a:prstGeom>
+            <a:noFill/>
+            <a:ln>
+              <a:noFill/>
+            </a:ln>
+          </p:spPr>
+          <p:txBody>
+            <a:bodyPr wrap="square" rtlCol="0">
+              <a:spAutoFit/>
+            </a:bodyPr>
+            <a:lstStyle/>
+            <a:p>
+              <a:pPr algn="ctr"/>
+              <a:r>
+                <a:rPr lang="en-US" sz="1400" dirty="0">
+                  <a:latin typeface="Avenir" panose="02000503020000020003" pitchFamily="2" charset="0"/>
+                </a:rPr>
+                <a:t>End</a:t>
+              </a:r>
+            </a:p>
+          </p:txBody>
+        </p:sp>
+        <p:sp>
+          <p:nvSpPr>
+            <p:cNvPr id="14" name="Rounded Rectangle 13">
+              <a:extLst>
+                <a:ext uri="{FF2B5EF4-FFF2-40B4-BE49-F238E27FC236}">
+                  <a16:creationId xmlns:a16="http://schemas.microsoft.com/office/drawing/2014/main" id="{1C95024C-E684-CD7B-1218-59AD7F51ACCC}"/>
+                </a:ext>
+              </a:extLst>
+            </p:cNvPr>
+            <p:cNvSpPr/>
+            <p:nvPr/>
+          </p:nvSpPr>
+          <p:spPr>
+            <a:xfrm>
+              <a:off x="4499602" y="5352614"/>
+              <a:ext cx="1937775" cy="621388"/>
+            </a:xfrm>
+            <a:prstGeom prst="roundRect">
+              <a:avLst/>
+            </a:prstGeom>
+            <a:solidFill>
+              <a:srgbClr val="DCEBF5"/>
+            </a:solidFill>
+            <a:ln w="19050">
+              <a:solidFill>
+                <a:srgbClr val="30335D"/>
+              </a:solidFill>
+            </a:ln>
+          </p:spPr>
+          <p:style>
+            <a:lnRef idx="2">
+              <a:schemeClr val="accent1">
+                <a:shade val="50000"/>
+              </a:schemeClr>
+            </a:lnRef>
+            <a:fillRef idx="1">
+              <a:schemeClr val="accent1"/>
+            </a:fillRef>
+            <a:effectRef idx="0">
+              <a:schemeClr val="accent1"/>
+            </a:effectRef>
+            <a:fontRef idx="minor">
+              <a:schemeClr val="lt1"/>
+            </a:fontRef>
+          </p:style>
+          <p:txBody>
+            <a:bodyPr rtlCol="0" anchor="ctr"/>
+            <a:lstStyle/>
+            <a:p>
+              <a:pPr algn="ctr"/>
+              <a:endParaRPr lang="en-US"/>
+            </a:p>
+          </p:txBody>
+        </p:sp>
+        <p:sp>
+          <p:nvSpPr>
+            <p:cNvPr id="15" name="TextBox 14">
+              <a:extLst>
+                <a:ext uri="{FF2B5EF4-FFF2-40B4-BE49-F238E27FC236}">
+                  <a16:creationId xmlns:a16="http://schemas.microsoft.com/office/drawing/2014/main" id="{35D747BC-451F-40B4-63D2-408A274D2362}"/>
+                </a:ext>
+              </a:extLst>
+            </p:cNvPr>
+            <p:cNvSpPr txBox="1"/>
+            <p:nvPr/>
+          </p:nvSpPr>
+          <p:spPr>
+            <a:xfrm>
+              <a:off x="4499601" y="5398371"/>
+              <a:ext cx="1937775" cy="523220"/>
+            </a:xfrm>
+            <a:prstGeom prst="rect">
+              <a:avLst/>
+            </a:prstGeom>
+            <a:noFill/>
+            <a:ln>
+              <a:noFill/>
+            </a:ln>
+          </p:spPr>
+          <p:txBody>
+            <a:bodyPr wrap="square" rtlCol="0">
+              <a:spAutoFit/>
+            </a:bodyPr>
+            <a:lstStyle/>
+            <a:p>
+              <a:pPr algn="ctr"/>
+              <a:r>
+                <a:rPr lang="en-US" sz="1400" dirty="0">
+                  <a:latin typeface="Avenir" panose="02000503020000020003" pitchFamily="2" charset="0"/>
+                </a:rPr>
+                <a:t>Send output to </a:t>
+              </a:r>
+            </a:p>
+            <a:p>
+              <a:pPr algn="ctr"/>
+              <a:r>
+                <a:rPr lang="en-US" sz="1400" dirty="0">
+                  <a:latin typeface="Avenir" panose="02000503020000020003" pitchFamily="2" charset="0"/>
+                </a:rPr>
+                <a:t>pin 12 Arduino</a:t>
+              </a:r>
+            </a:p>
+          </p:txBody>
+        </p:sp>
+        <p:sp>
+          <p:nvSpPr>
+            <p:cNvPr id="16" name="Decision 15">
+              <a:extLst>
+                <a:ext uri="{FF2B5EF4-FFF2-40B4-BE49-F238E27FC236}">
+                  <a16:creationId xmlns:a16="http://schemas.microsoft.com/office/drawing/2014/main" id="{CEE12BCE-E5F1-8B63-E658-33E13B9A8AB6}"/>
+                </a:ext>
+              </a:extLst>
+            </p:cNvPr>
+            <p:cNvSpPr/>
+            <p:nvPr/>
+          </p:nvSpPr>
+          <p:spPr>
+            <a:xfrm>
+              <a:off x="4674008" y="2573987"/>
+              <a:ext cx="1582582" cy="830998"/>
+            </a:xfrm>
+            <a:prstGeom prst="flowChartDecision">
+              <a:avLst/>
+            </a:prstGeom>
+            <a:solidFill>
+              <a:srgbClr val="D2D3F1"/>
+            </a:solidFill>
+            <a:ln>
+              <a:solidFill>
+                <a:schemeClr val="tx1"/>
+              </a:solidFill>
+            </a:ln>
+          </p:spPr>
+          <p:style>
+            <a:lnRef idx="2">
+              <a:schemeClr val="accent1">
+                <a:shade val="50000"/>
+              </a:schemeClr>
+            </a:lnRef>
+            <a:fillRef idx="1">
+              <a:schemeClr val="accent1"/>
+            </a:fillRef>
+            <a:effectRef idx="0">
+              <a:schemeClr val="accent1"/>
+            </a:effectRef>
+            <a:fontRef idx="minor">
+              <a:schemeClr val="lt1"/>
+            </a:fontRef>
+          </p:style>
+          <p:txBody>
+            <a:bodyPr rtlCol="0" anchor="ctr"/>
+            <a:lstStyle/>
+            <a:p>
+              <a:pPr algn="ctr"/>
+              <a:endParaRPr lang="en-US"/>
+            </a:p>
+          </p:txBody>
+        </p:sp>
+        <p:sp>
+          <p:nvSpPr>
+            <p:cNvPr id="17" name="TextBox 16">
+              <a:extLst>
+                <a:ext uri="{FF2B5EF4-FFF2-40B4-BE49-F238E27FC236}">
+                  <a16:creationId xmlns:a16="http://schemas.microsoft.com/office/drawing/2014/main" id="{0A849DAC-0458-29D3-7FC0-2926557EE4BE}"/>
+                </a:ext>
+              </a:extLst>
+            </p:cNvPr>
+            <p:cNvSpPr txBox="1"/>
+            <p:nvPr/>
+          </p:nvSpPr>
+          <p:spPr>
+            <a:xfrm>
+              <a:off x="4686198" y="2596140"/>
+              <a:ext cx="1582583" cy="738664"/>
+            </a:xfrm>
+            <a:prstGeom prst="rect">
+              <a:avLst/>
+            </a:prstGeom>
+            <a:noFill/>
+            <a:ln>
+              <a:noFill/>
+            </a:ln>
+          </p:spPr>
+          <p:txBody>
+            <a:bodyPr wrap="square" rtlCol="0">
+              <a:spAutoFit/>
+            </a:bodyPr>
+            <a:lstStyle/>
+            <a:p>
+              <a:pPr algn="ctr"/>
+              <a:r>
+                <a:rPr lang="en-US" sz="1400" dirty="0">
+                  <a:latin typeface="Avenir" panose="02000503020000020003" pitchFamily="2" charset="0"/>
+                </a:rPr>
+                <a:t>Is </a:t>
+              </a:r>
+            </a:p>
+            <a:p>
+              <a:pPr algn="ctr"/>
+              <a:r>
+                <a:rPr lang="en-US" sz="1400" dirty="0">
+                  <a:latin typeface="Avenir" panose="02000503020000020003" pitchFamily="2" charset="0"/>
+                </a:rPr>
+                <a:t>the input </a:t>
+              </a:r>
+            </a:p>
+            <a:p>
+              <a:pPr algn="ctr"/>
+              <a:r>
+                <a:rPr lang="en-US" sz="1400" dirty="0">
+                  <a:latin typeface="Avenir" panose="02000503020000020003" pitchFamily="2" charset="0"/>
+                </a:rPr>
+                <a:t>HIGH?</a:t>
+              </a:r>
+            </a:p>
+          </p:txBody>
+        </p:sp>
+        <p:sp>
+          <p:nvSpPr>
+            <p:cNvPr id="18" name="Decision 17">
+              <a:extLst>
+                <a:ext uri="{FF2B5EF4-FFF2-40B4-BE49-F238E27FC236}">
+                  <a16:creationId xmlns:a16="http://schemas.microsoft.com/office/drawing/2014/main" id="{78CFA859-36E7-295E-AAB7-FCA363486836}"/>
+                </a:ext>
+              </a:extLst>
+            </p:cNvPr>
+            <p:cNvSpPr/>
+            <p:nvPr/>
+          </p:nvSpPr>
+          <p:spPr>
+            <a:xfrm>
+              <a:off x="4760976" y="4491889"/>
+              <a:ext cx="1325880" cy="730634"/>
+            </a:xfrm>
+            <a:prstGeom prst="flowChartDecision">
+              <a:avLst/>
+            </a:prstGeom>
+            <a:solidFill>
+              <a:srgbClr val="D2D3F1"/>
+            </a:solidFill>
+            <a:ln>
+              <a:solidFill>
+                <a:schemeClr val="tx1"/>
+              </a:solidFill>
+            </a:ln>
+          </p:spPr>
+          <p:style>
+            <a:lnRef idx="2">
+              <a:schemeClr val="accent1">
+                <a:shade val="50000"/>
+              </a:schemeClr>
+            </a:lnRef>
+            <a:fillRef idx="1">
+              <a:schemeClr val="accent1"/>
+            </a:fillRef>
+            <a:effectRef idx="0">
+              <a:schemeClr val="accent1"/>
+            </a:effectRef>
+            <a:fontRef idx="minor">
+              <a:schemeClr val="lt1"/>
+            </a:fontRef>
+          </p:style>
+          <p:txBody>
+            <a:bodyPr rtlCol="0" anchor="ctr"/>
+            <a:lstStyle/>
+            <a:p>
+              <a:pPr algn="ctr"/>
+              <a:endParaRPr lang="en-US"/>
+            </a:p>
+          </p:txBody>
+        </p:sp>
+        <p:sp>
+          <p:nvSpPr>
+            <p:cNvPr id="19" name="TextBox 18">
+              <a:extLst>
+                <a:ext uri="{FF2B5EF4-FFF2-40B4-BE49-F238E27FC236}">
+                  <a16:creationId xmlns:a16="http://schemas.microsoft.com/office/drawing/2014/main" id="{31555E8F-A61B-3016-F048-F0C1E1848A43}"/>
+                </a:ext>
+              </a:extLst>
+            </p:cNvPr>
+            <p:cNvSpPr txBox="1"/>
+            <p:nvPr/>
+          </p:nvSpPr>
+          <p:spPr>
+            <a:xfrm>
+              <a:off x="4760976" y="4596558"/>
+              <a:ext cx="1325880" cy="523220"/>
+            </a:xfrm>
+            <a:prstGeom prst="rect">
+              <a:avLst/>
+            </a:prstGeom>
+            <a:noFill/>
+            <a:ln>
+              <a:noFill/>
+            </a:ln>
+          </p:spPr>
+          <p:txBody>
+            <a:bodyPr wrap="square" rtlCol="0">
+              <a:spAutoFit/>
+            </a:bodyPr>
+            <a:lstStyle/>
+            <a:p>
+              <a:pPr algn="ctr"/>
+              <a:r>
+                <a:rPr lang="en-US" sz="1400" dirty="0">
+                  <a:latin typeface="Avenir" panose="02000503020000020003" pitchFamily="2" charset="0"/>
+                </a:rPr>
+                <a:t>Is it </a:t>
+              </a:r>
+            </a:p>
+            <a:p>
+              <a:pPr algn="ctr"/>
+              <a:r>
+                <a:rPr lang="en-US" sz="1400" dirty="0">
+                  <a:latin typeface="Avenir" panose="02000503020000020003" pitchFamily="2" charset="0"/>
+                </a:rPr>
+                <a:t>True?</a:t>
+              </a:r>
+            </a:p>
+          </p:txBody>
+        </p:sp>
+        <p:cxnSp>
+          <p:nvCxnSpPr>
+            <p:cNvPr id="29" name="Straight Arrow Connector 28">
+              <a:extLst>
+                <a:ext uri="{FF2B5EF4-FFF2-40B4-BE49-F238E27FC236}">
+                  <a16:creationId xmlns:a16="http://schemas.microsoft.com/office/drawing/2014/main" id="{BC2810F3-5C41-5457-97E0-A12BAA0755DB}"/>
+                </a:ext>
+              </a:extLst>
+            </p:cNvPr>
+            <p:cNvCxnSpPr>
+              <a:stCxn id="10" idx="2"/>
+            </p:cNvCxnSpPr>
+            <p:nvPr/>
+          </p:nvCxnSpPr>
+          <p:spPr>
+            <a:xfrm flipH="1">
+              <a:off x="5445251" y="1620660"/>
+              <a:ext cx="1" cy="202357"/>
+            </a:xfrm>
+            <a:prstGeom prst="straightConnector1">
+              <a:avLst/>
+            </a:prstGeom>
+            <a:ln w="28575">
+              <a:solidFill>
+                <a:srgbClr val="30335D"/>
+              </a:solidFill>
+              <a:tailEnd type="triangle"/>
+            </a:ln>
+          </p:spPr>
+          <p:style>
+            <a:lnRef idx="1">
+              <a:schemeClr val="accent1"/>
+            </a:lnRef>
+            <a:fillRef idx="0">
+              <a:schemeClr val="accent1"/>
+            </a:fillRef>
+            <a:effectRef idx="0">
+              <a:schemeClr val="accent1"/>
+            </a:effectRef>
+            <a:fontRef idx="minor">
+              <a:schemeClr val="tx1"/>
+            </a:fontRef>
+          </p:style>
+        </p:cxnSp>
+        <p:cxnSp>
+          <p:nvCxnSpPr>
+            <p:cNvPr id="30" name="Straight Arrow Connector 29">
+              <a:extLst>
+                <a:ext uri="{FF2B5EF4-FFF2-40B4-BE49-F238E27FC236}">
+                  <a16:creationId xmlns:a16="http://schemas.microsoft.com/office/drawing/2014/main" id="{94D0E66E-F829-FCA1-357C-5E75877506C2}"/>
+                </a:ext>
+              </a:extLst>
+            </p:cNvPr>
+            <p:cNvCxnSpPr>
+              <a:cxnSpLocks/>
+              <a:stCxn id="3" idx="2"/>
+            </p:cNvCxnSpPr>
+            <p:nvPr/>
+          </p:nvCxnSpPr>
+          <p:spPr>
+            <a:xfrm>
+              <a:off x="5468489" y="2453733"/>
+              <a:ext cx="1588" cy="139159"/>
+            </a:xfrm>
+            <a:prstGeom prst="straightConnector1">
+              <a:avLst/>
+            </a:prstGeom>
+            <a:ln w="28575">
+              <a:solidFill>
+                <a:srgbClr val="30335D"/>
+              </a:solidFill>
+              <a:tailEnd type="triangle"/>
+            </a:ln>
+          </p:spPr>
+          <p:style>
+            <a:lnRef idx="1">
+              <a:schemeClr val="accent1"/>
+            </a:lnRef>
+            <a:fillRef idx="0">
+              <a:schemeClr val="accent1"/>
+            </a:fillRef>
+            <a:effectRef idx="0">
+              <a:schemeClr val="accent1"/>
+            </a:effectRef>
+            <a:fontRef idx="minor">
+              <a:schemeClr val="tx1"/>
+            </a:fontRef>
+          </p:style>
+        </p:cxnSp>
+        <p:cxnSp>
+          <p:nvCxnSpPr>
+            <p:cNvPr id="32" name="Straight Arrow Connector 31">
+              <a:extLst>
+                <a:ext uri="{FF2B5EF4-FFF2-40B4-BE49-F238E27FC236}">
+                  <a16:creationId xmlns:a16="http://schemas.microsoft.com/office/drawing/2014/main" id="{EFB1004C-900D-8487-3FEF-2A61A316EC74}"/>
+                </a:ext>
+              </a:extLst>
+            </p:cNvPr>
+            <p:cNvCxnSpPr>
+              <a:cxnSpLocks/>
+            </p:cNvCxnSpPr>
+            <p:nvPr/>
+          </p:nvCxnSpPr>
+          <p:spPr>
+            <a:xfrm>
+              <a:off x="5465297" y="3405129"/>
+              <a:ext cx="1588" cy="139159"/>
+            </a:xfrm>
+            <a:prstGeom prst="straightConnector1">
+              <a:avLst/>
+            </a:prstGeom>
+            <a:ln w="28575">
+              <a:solidFill>
+                <a:srgbClr val="30335D"/>
+              </a:solidFill>
+              <a:tailEnd type="triangle"/>
+            </a:ln>
+          </p:spPr>
+          <p:style>
+            <a:lnRef idx="1">
+              <a:schemeClr val="accent1"/>
+            </a:lnRef>
+            <a:fillRef idx="0">
+              <a:schemeClr val="accent1"/>
+            </a:fillRef>
+            <a:effectRef idx="0">
+              <a:schemeClr val="accent1"/>
+            </a:effectRef>
+            <a:fontRef idx="minor">
+              <a:schemeClr val="tx1"/>
+            </a:fontRef>
+          </p:style>
+        </p:cxnSp>
+        <p:cxnSp>
+          <p:nvCxnSpPr>
+            <p:cNvPr id="33" name="Straight Arrow Connector 32">
+              <a:extLst>
+                <a:ext uri="{FF2B5EF4-FFF2-40B4-BE49-F238E27FC236}">
+                  <a16:creationId xmlns:a16="http://schemas.microsoft.com/office/drawing/2014/main" id="{1A299620-896C-F177-D06D-326EA5351DF9}"/>
+                </a:ext>
+              </a:extLst>
+            </p:cNvPr>
+            <p:cNvCxnSpPr>
+              <a:cxnSpLocks/>
+            </p:cNvCxnSpPr>
+            <p:nvPr/>
+          </p:nvCxnSpPr>
+          <p:spPr>
+            <a:xfrm>
+              <a:off x="5422328" y="4371037"/>
+              <a:ext cx="1588" cy="139159"/>
+            </a:xfrm>
+            <a:prstGeom prst="straightConnector1">
+              <a:avLst/>
+            </a:prstGeom>
+            <a:ln w="28575">
+              <a:solidFill>
+                <a:srgbClr val="30335D"/>
+              </a:solidFill>
+              <a:tailEnd type="triangle"/>
+            </a:ln>
+          </p:spPr>
+          <p:style>
+            <a:lnRef idx="1">
+              <a:schemeClr val="accent1"/>
+            </a:lnRef>
+            <a:fillRef idx="0">
+              <a:schemeClr val="accent1"/>
+            </a:fillRef>
+            <a:effectRef idx="0">
+              <a:schemeClr val="accent1"/>
+            </a:effectRef>
+            <a:fontRef idx="minor">
+              <a:schemeClr val="tx1"/>
+            </a:fontRef>
+          </p:style>
+        </p:cxnSp>
+        <p:cxnSp>
+          <p:nvCxnSpPr>
+            <p:cNvPr id="34" name="Straight Arrow Connector 33">
+              <a:extLst>
+                <a:ext uri="{FF2B5EF4-FFF2-40B4-BE49-F238E27FC236}">
+                  <a16:creationId xmlns:a16="http://schemas.microsoft.com/office/drawing/2014/main" id="{08342E1B-31F3-0B2F-CAE5-562C9B612260}"/>
+                </a:ext>
+              </a:extLst>
+            </p:cNvPr>
+            <p:cNvCxnSpPr>
+              <a:cxnSpLocks/>
+            </p:cNvCxnSpPr>
+            <p:nvPr/>
+          </p:nvCxnSpPr>
+          <p:spPr>
+            <a:xfrm>
+              <a:off x="5427644" y="5213418"/>
+              <a:ext cx="1588" cy="139159"/>
+            </a:xfrm>
+            <a:prstGeom prst="straightConnector1">
+              <a:avLst/>
+            </a:prstGeom>
+            <a:ln w="28575">
+              <a:solidFill>
+                <a:srgbClr val="30335D"/>
+              </a:solidFill>
+              <a:tailEnd type="triangle"/>
+            </a:ln>
+          </p:spPr>
+          <p:style>
+            <a:lnRef idx="1">
+              <a:schemeClr val="accent1"/>
+            </a:lnRef>
+            <a:fillRef idx="0">
+              <a:schemeClr val="accent1"/>
+            </a:fillRef>
+            <a:effectRef idx="0">
+              <a:schemeClr val="accent1"/>
+            </a:effectRef>
+            <a:fontRef idx="minor">
+              <a:schemeClr val="tx1"/>
+            </a:fontRef>
+          </p:style>
+        </p:cxnSp>
+        <p:cxnSp>
+          <p:nvCxnSpPr>
+            <p:cNvPr id="35" name="Straight Arrow Connector 34">
+              <a:extLst>
+                <a:ext uri="{FF2B5EF4-FFF2-40B4-BE49-F238E27FC236}">
+                  <a16:creationId xmlns:a16="http://schemas.microsoft.com/office/drawing/2014/main" id="{0207701D-B3A5-F988-F963-52D73F1BCF0D}"/>
+                </a:ext>
+              </a:extLst>
+            </p:cNvPr>
+            <p:cNvCxnSpPr>
+              <a:cxnSpLocks/>
+            </p:cNvCxnSpPr>
+            <p:nvPr/>
+          </p:nvCxnSpPr>
+          <p:spPr>
+            <a:xfrm>
+              <a:off x="5429232" y="5983183"/>
+              <a:ext cx="1588" cy="139159"/>
+            </a:xfrm>
+            <a:prstGeom prst="straightConnector1">
+              <a:avLst/>
+            </a:prstGeom>
+            <a:ln w="28575">
+              <a:solidFill>
+                <a:srgbClr val="30335D"/>
+              </a:solidFill>
+              <a:tailEnd type="triangle"/>
+            </a:ln>
+          </p:spPr>
+          <p:style>
+            <a:lnRef idx="1">
+              <a:schemeClr val="accent1"/>
+            </a:lnRef>
+            <a:fillRef idx="0">
+              <a:schemeClr val="accent1"/>
+            </a:fillRef>
+            <a:effectRef idx="0">
+              <a:schemeClr val="accent1"/>
+            </a:effectRef>
+            <a:fontRef idx="minor">
+              <a:schemeClr val="tx1"/>
+            </a:fontRef>
+          </p:style>
+        </p:cxnSp>
+        <p:cxnSp>
+          <p:nvCxnSpPr>
+            <p:cNvPr id="36" name="Straight Arrow Connector 35">
+              <a:extLst>
+                <a:ext uri="{FF2B5EF4-FFF2-40B4-BE49-F238E27FC236}">
+                  <a16:creationId xmlns:a16="http://schemas.microsoft.com/office/drawing/2014/main" id="{AF389EE0-B527-5BE8-3B47-670D85B9B096}"/>
+                </a:ext>
+              </a:extLst>
+            </p:cNvPr>
+            <p:cNvCxnSpPr>
+              <a:cxnSpLocks/>
+            </p:cNvCxnSpPr>
+            <p:nvPr/>
+          </p:nvCxnSpPr>
+          <p:spPr>
+            <a:xfrm flipV="1">
+              <a:off x="8120801" y="4170620"/>
+              <a:ext cx="0" cy="698698"/>
+            </a:xfrm>
+            <a:prstGeom prst="straightConnector1">
+              <a:avLst/>
+            </a:prstGeom>
+            <a:ln w="28575">
+              <a:solidFill>
+                <a:srgbClr val="30335D"/>
+              </a:solidFill>
+              <a:tailEnd type="triangle"/>
+            </a:ln>
+          </p:spPr>
+          <p:style>
+            <a:lnRef idx="1">
+              <a:schemeClr val="accent1"/>
+            </a:lnRef>
+            <a:fillRef idx="0">
+              <a:schemeClr val="accent1"/>
+            </a:fillRef>
+            <a:effectRef idx="0">
+              <a:schemeClr val="accent1"/>
+            </a:effectRef>
+            <a:fontRef idx="minor">
+              <a:schemeClr val="tx1"/>
+            </a:fontRef>
+          </p:style>
+        </p:cxnSp>
+        <p:cxnSp>
+          <p:nvCxnSpPr>
+            <p:cNvPr id="38" name="Straight Arrow Connector 37">
+              <a:extLst>
+                <a:ext uri="{FF2B5EF4-FFF2-40B4-BE49-F238E27FC236}">
+                  <a16:creationId xmlns:a16="http://schemas.microsoft.com/office/drawing/2014/main" id="{1EECF3A4-672D-7D11-41B7-0991F3A3A20A}"/>
+                </a:ext>
+              </a:extLst>
+            </p:cNvPr>
+            <p:cNvCxnSpPr>
+              <a:cxnSpLocks/>
+            </p:cNvCxnSpPr>
+            <p:nvPr/>
+          </p:nvCxnSpPr>
+          <p:spPr>
+            <a:xfrm flipH="1">
+              <a:off x="5465297" y="1680420"/>
+              <a:ext cx="2655504" cy="8329"/>
+            </a:xfrm>
+            <a:prstGeom prst="straightConnector1">
+              <a:avLst/>
+            </a:prstGeom>
+            <a:ln w="28575">
+              <a:solidFill>
+                <a:srgbClr val="30335D"/>
+              </a:solidFill>
+              <a:tailEnd type="triangle"/>
+            </a:ln>
+          </p:spPr>
+          <p:style>
+            <a:lnRef idx="1">
+              <a:schemeClr val="accent1"/>
+            </a:lnRef>
+            <a:fillRef idx="0">
+              <a:schemeClr val="accent1"/>
+            </a:fillRef>
+            <a:effectRef idx="0">
+              <a:schemeClr val="accent1"/>
+            </a:effectRef>
+            <a:fontRef idx="minor">
+              <a:schemeClr val="tx1"/>
+            </a:fontRef>
+          </p:style>
+        </p:cxnSp>
+        <p:cxnSp>
+          <p:nvCxnSpPr>
+            <p:cNvPr id="41" name="Straight Arrow Connector 40">
+              <a:extLst>
+                <a:ext uri="{FF2B5EF4-FFF2-40B4-BE49-F238E27FC236}">
+                  <a16:creationId xmlns:a16="http://schemas.microsoft.com/office/drawing/2014/main" id="{52305F71-3A1E-C995-485D-F46B8272D7C3}"/>
+                </a:ext>
+              </a:extLst>
+            </p:cNvPr>
+            <p:cNvCxnSpPr>
+              <a:cxnSpLocks/>
+            </p:cNvCxnSpPr>
+            <p:nvPr/>
+          </p:nvCxnSpPr>
+          <p:spPr>
+            <a:xfrm>
+              <a:off x="6256589" y="2989486"/>
+              <a:ext cx="1864212" cy="0"/>
+            </a:xfrm>
+            <a:prstGeom prst="straightConnector1">
+              <a:avLst/>
+            </a:prstGeom>
+            <a:ln w="28575">
+              <a:solidFill>
+                <a:srgbClr val="30335D"/>
+              </a:solidFill>
+              <a:tailEnd type="triangle"/>
+            </a:ln>
+          </p:spPr>
+          <p:style>
+            <a:lnRef idx="1">
+              <a:schemeClr val="accent1"/>
+            </a:lnRef>
+            <a:fillRef idx="0">
+              <a:schemeClr val="accent1"/>
+            </a:fillRef>
+            <a:effectRef idx="0">
+              <a:schemeClr val="accent1"/>
+            </a:effectRef>
+            <a:fontRef idx="minor">
+              <a:schemeClr val="tx1"/>
+            </a:fontRef>
+          </p:style>
+        </p:cxnSp>
+        <p:sp>
+          <p:nvSpPr>
+            <p:cNvPr id="54" name="TextBox 53">
+              <a:extLst>
+                <a:ext uri="{FF2B5EF4-FFF2-40B4-BE49-F238E27FC236}">
+                  <a16:creationId xmlns:a16="http://schemas.microsoft.com/office/drawing/2014/main" id="{D1380BC0-B1FC-C995-C2F1-5AA43116166E}"/>
+                </a:ext>
+              </a:extLst>
+            </p:cNvPr>
+            <p:cNvSpPr txBox="1"/>
+            <p:nvPr/>
+          </p:nvSpPr>
+          <p:spPr>
+            <a:xfrm>
+              <a:off x="5597786" y="3278601"/>
+              <a:ext cx="657080" cy="307777"/>
+            </a:xfrm>
+            <a:prstGeom prst="rect">
+              <a:avLst/>
+            </a:prstGeom>
+            <a:noFill/>
+            <a:ln>
+              <a:noFill/>
+            </a:ln>
+          </p:spPr>
+          <p:txBody>
+            <a:bodyPr wrap="square" rtlCol="0">
+              <a:spAutoFit/>
+            </a:bodyPr>
+            <a:lstStyle/>
+            <a:p>
+              <a:pPr algn="ctr"/>
+              <a:r>
+                <a:rPr lang="en-US" sz="1400" dirty="0">
+                  <a:latin typeface="Avenir Medium" panose="02000503020000020003" pitchFamily="2" charset="0"/>
+                </a:rPr>
+                <a:t>Yes</a:t>
+              </a:r>
+            </a:p>
+          </p:txBody>
+        </p:sp>
+        <p:sp>
+          <p:nvSpPr>
+            <p:cNvPr id="55" name="TextBox 54">
+              <a:extLst>
+                <a:ext uri="{FF2B5EF4-FFF2-40B4-BE49-F238E27FC236}">
+                  <a16:creationId xmlns:a16="http://schemas.microsoft.com/office/drawing/2014/main" id="{216BDB90-80DB-6A5F-F4D7-E6F970D13F64}"/>
+                </a:ext>
+              </a:extLst>
+            </p:cNvPr>
+            <p:cNvSpPr txBox="1"/>
+            <p:nvPr/>
+          </p:nvSpPr>
+          <p:spPr>
+            <a:xfrm>
+              <a:off x="5514476" y="5088365"/>
+              <a:ext cx="657080" cy="307777"/>
+            </a:xfrm>
+            <a:prstGeom prst="rect">
+              <a:avLst/>
+            </a:prstGeom>
+            <a:noFill/>
+            <a:ln>
+              <a:noFill/>
+            </a:ln>
+          </p:spPr>
+          <p:txBody>
+            <a:bodyPr wrap="square" rtlCol="0">
+              <a:spAutoFit/>
+            </a:bodyPr>
+            <a:lstStyle/>
+            <a:p>
+              <a:pPr algn="ctr"/>
+              <a:r>
+                <a:rPr lang="en-US" sz="1400" dirty="0">
+                  <a:latin typeface="Avenir Medium" panose="02000503020000020003" pitchFamily="2" charset="0"/>
+                </a:rPr>
+                <a:t>Yes</a:t>
+              </a:r>
+            </a:p>
+          </p:txBody>
+        </p:sp>
+        <p:sp>
+          <p:nvSpPr>
+            <p:cNvPr id="56" name="TextBox 55">
+              <a:extLst>
+                <a:ext uri="{FF2B5EF4-FFF2-40B4-BE49-F238E27FC236}">
+                  <a16:creationId xmlns:a16="http://schemas.microsoft.com/office/drawing/2014/main" id="{0ECE48B7-1688-04F5-8BAE-A9F15646E653}"/>
+                </a:ext>
+              </a:extLst>
+            </p:cNvPr>
+            <p:cNvSpPr txBox="1"/>
+            <p:nvPr/>
+          </p:nvSpPr>
+          <p:spPr>
+            <a:xfrm>
+              <a:off x="6662632" y="4579416"/>
+              <a:ext cx="657080" cy="307777"/>
+            </a:xfrm>
+            <a:prstGeom prst="rect">
+              <a:avLst/>
+            </a:prstGeom>
+            <a:noFill/>
+            <a:ln>
+              <a:noFill/>
+            </a:ln>
+          </p:spPr>
+          <p:txBody>
+            <a:bodyPr wrap="square" rtlCol="0">
+              <a:spAutoFit/>
+            </a:bodyPr>
+            <a:lstStyle/>
+            <a:p>
+              <a:pPr algn="ctr"/>
+              <a:r>
+                <a:rPr lang="en-US" sz="1400" dirty="0">
+                  <a:latin typeface="Avenir Medium" panose="02000503020000020003" pitchFamily="2" charset="0"/>
+                </a:rPr>
+                <a:t>No</a:t>
+              </a:r>
+            </a:p>
+          </p:txBody>
+        </p:sp>
+        <p:sp>
+          <p:nvSpPr>
+            <p:cNvPr id="57" name="TextBox 56">
+              <a:extLst>
+                <a:ext uri="{FF2B5EF4-FFF2-40B4-BE49-F238E27FC236}">
+                  <a16:creationId xmlns:a16="http://schemas.microsoft.com/office/drawing/2014/main" id="{14116BE4-91E1-54C4-8626-C71E1BADAF9B}"/>
+                </a:ext>
+              </a:extLst>
+            </p:cNvPr>
+            <p:cNvSpPr txBox="1"/>
+            <p:nvPr/>
+          </p:nvSpPr>
+          <p:spPr>
+            <a:xfrm>
+              <a:off x="6687016" y="2719383"/>
+              <a:ext cx="657080" cy="307777"/>
+            </a:xfrm>
+            <a:prstGeom prst="rect">
+              <a:avLst/>
+            </a:prstGeom>
+            <a:noFill/>
+            <a:ln>
+              <a:noFill/>
+            </a:ln>
+          </p:spPr>
+          <p:txBody>
+            <a:bodyPr wrap="square" rtlCol="0">
+              <a:spAutoFit/>
+            </a:bodyPr>
+            <a:lstStyle/>
+            <a:p>
+              <a:pPr algn="ctr"/>
+              <a:r>
+                <a:rPr lang="en-US" sz="1400" dirty="0">
+                  <a:latin typeface="Avenir Medium" panose="02000503020000020003" pitchFamily="2" charset="0"/>
+                </a:rPr>
+                <a:t>No</a:t>
+              </a:r>
+            </a:p>
+          </p:txBody>
+        </p:sp>
+      </p:grpSp>
     </p:spTree>
     <p:extLst>
       <p:ext uri="{BB962C8B-B14F-4D97-AF65-F5344CB8AC3E}">
@@ -9936,7 +11424,7 @@
             <a:r>
               <a:rPr lang="en-US" sz="2800" dirty="0">
                 <a:solidFill>
-                  <a:srgbClr val="64B57A"/>
+                  <a:srgbClr val="5A5AA8"/>
                 </a:solidFill>
                 <a:latin typeface="Avenir" panose="02000503020000020003" pitchFamily="2" charset="0"/>
                 <a:cs typeface="Futura Medium" panose="020B0602020204020303"/>
@@ -10005,7 +11493,7 @@
             <a:r>
               <a:rPr lang="en-US" sz="2800" dirty="0">
                 <a:solidFill>
-                  <a:srgbClr val="5EBB78"/>
+                  <a:srgbClr val="5A5AA8"/>
                 </a:solidFill>
                 <a:latin typeface="Avenir" panose="02000503020000020003" pitchFamily="2" charset="0"/>
                 <a:cs typeface="Futura Medium" panose="020B0602020204020303"/>
@@ -10079,7 +11567,7 @@
         <p:spPr>
           <a:xfrm>
             <a:off x="984504" y="3923592"/>
-            <a:ext cx="10430256" cy="1384995"/>
+            <a:ext cx="10430256" cy="1815882"/>
           </a:xfrm>
           <a:prstGeom prst="rect">
             <a:avLst/>
@@ -10116,7 +11604,7 @@
             <a:r>
               <a:rPr lang="en-US" sz="2800" dirty="0">
                 <a:solidFill>
-                  <a:srgbClr val="5EBB78"/>
+                  <a:srgbClr val="5A5AA8"/>
                 </a:solidFill>
                 <a:latin typeface="Avenir" panose="02000503020000020003" pitchFamily="2" charset="0"/>
                 <a:cs typeface="Futura Medium" panose="020B0602020204020303"/>
@@ -10133,7 +11621,7 @@
             <a:r>
               <a:rPr lang="en-US" sz="2800" dirty="0">
                 <a:solidFill>
-                  <a:srgbClr val="5EBB78"/>
+                  <a:srgbClr val="5A5AA8"/>
                 </a:solidFill>
                 <a:latin typeface="Avenir" panose="02000503020000020003" pitchFamily="2" charset="0"/>
                 <a:cs typeface="Futura Medium" panose="020B0602020204020303"/>
@@ -10150,7 +11638,7 @@
             <a:r>
               <a:rPr lang="en-US" sz="2800" dirty="0">
                 <a:solidFill>
-                  <a:srgbClr val="5EBB78"/>
+                  <a:srgbClr val="5A5AA8"/>
                 </a:solidFill>
                 <a:latin typeface="Avenir" panose="02000503020000020003" pitchFamily="2" charset="0"/>
                 <a:cs typeface="Futura Medium" panose="020B0602020204020303"/>
@@ -10167,12 +11655,32 @@
             <a:r>
               <a:rPr lang="en-US" sz="2800" dirty="0">
                 <a:solidFill>
-                  <a:srgbClr val="5EBB78"/>
+                  <a:srgbClr val="5A5AA8"/>
                 </a:solidFill>
                 <a:latin typeface="Avenir" panose="02000503020000020003" pitchFamily="2" charset="0"/>
                 <a:cs typeface="Futura Medium" panose="020B0602020204020303"/>
               </a:rPr>
-              <a:t>built-in functions</a:t>
+              <a:t>built-in</a:t>
+            </a:r>
+            <a:r>
+              <a:rPr lang="en-US" sz="2800" dirty="0">
+                <a:solidFill>
+                  <a:srgbClr val="5EBB78"/>
+                </a:solidFill>
+                <a:latin typeface="Avenir" panose="02000503020000020003" pitchFamily="2" charset="0"/>
+                <a:cs typeface="Futura Medium" panose="020B0602020204020303"/>
+              </a:rPr>
+              <a:t> </a:t>
+            </a:r>
+            <a:r>
+              <a:rPr lang="en-US" sz="2800" dirty="0">
+                <a:solidFill>
+                  <a:srgbClr val="5A5AA8"/>
+                </a:solidFill>
+                <a:latin typeface="Avenir" panose="02000503020000020003" pitchFamily="2" charset="0"/>
+                <a:cs typeface="Futura Medium" panose="020B0602020204020303"/>
+              </a:rPr>
+              <a:t>functions</a:t>
             </a:r>
             <a:r>
               <a:rPr lang="en-US" sz="2800" dirty="0">
@@ -10194,7 +11702,7 @@
             <a:r>
               <a:rPr lang="en-US" sz="2800" dirty="0">
                 <a:solidFill>
-                  <a:srgbClr val="5EBB78"/>
+                  <a:srgbClr val="5A5AA8"/>
                 </a:solidFill>
                 <a:latin typeface="Avenir" panose="02000503020000020003" pitchFamily="2" charset="0"/>
                 <a:cs typeface="Futura Medium" panose="020B0602020204020303"/>
@@ -12568,16 +14076,10 @@
             <a:avLst/>
           </a:prstGeom>
           <a:solidFill>
-            <a:schemeClr val="bg1">
-              <a:lumMod val="95000"/>
-            </a:schemeClr>
+            <a:schemeClr val="bg1"/>
           </a:solidFill>
           <a:ln>
-            <a:solidFill>
-              <a:schemeClr val="bg1">
-                <a:lumMod val="85000"/>
-              </a:schemeClr>
-            </a:solidFill>
+            <a:noFill/>
           </a:ln>
         </p:spPr>
         <p:txBody>

</xml_diff>